<commit_message>
construct Secondlevel and the trap
</commit_message>
<xml_diff>
--- a/presentations/AlphaTest_IWannaBeADreamer.pptx
+++ b/presentations/AlphaTest_IWannaBeADreamer.pptx
@@ -5,49 +5,48 @@
     <p:sldMasterId id="2147483648" r:id="rId1"/>
   </p:sldMasterIdLst>
   <p:notesMasterIdLst>
-    <p:notesMasterId r:id="rId13"/>
+    <p:notesMasterId r:id="rId12"/>
   </p:notesMasterIdLst>
   <p:handoutMasterIdLst>
-    <p:handoutMasterId r:id="rId14"/>
+    <p:handoutMasterId r:id="rId13"/>
   </p:handoutMasterIdLst>
   <p:sldIdLst>
     <p:sldId id="256" r:id="rId2"/>
     <p:sldId id="259" r:id="rId3"/>
     <p:sldId id="257" r:id="rId4"/>
-    <p:sldId id="260" r:id="rId5"/>
-    <p:sldId id="263" r:id="rId6"/>
-    <p:sldId id="261" r:id="rId7"/>
-    <p:sldId id="284" r:id="rId8"/>
-    <p:sldId id="270" r:id="rId9"/>
-    <p:sldId id="265" r:id="rId10"/>
-    <p:sldId id="273" r:id="rId11"/>
-    <p:sldId id="281" r:id="rId12"/>
+    <p:sldId id="263" r:id="rId5"/>
+    <p:sldId id="261" r:id="rId6"/>
+    <p:sldId id="284" r:id="rId7"/>
+    <p:sldId id="270" r:id="rId8"/>
+    <p:sldId id="265" r:id="rId9"/>
+    <p:sldId id="273" r:id="rId10"/>
+    <p:sldId id="281" r:id="rId11"/>
   </p:sldIdLst>
   <p:sldSz cx="12192000" cy="6858000"/>
   <p:notesSz cx="6858000" cy="9144000"/>
   <p:embeddedFontLst>
     <p:embeddedFont>
       <p:font typeface="黑体" pitchFamily="49" charset="-122"/>
-      <p:regular r:id="rId15"/>
+      <p:regular r:id="rId14"/>
     </p:embeddedFont>
     <p:embeddedFont>
       <p:font typeface="Bodoni MT Black" pitchFamily="18" charset="0"/>
-      <p:bold r:id="rId16"/>
-      <p:boldItalic r:id="rId17"/>
+      <p:bold r:id="rId15"/>
+      <p:boldItalic r:id="rId16"/>
     </p:embeddedFont>
     <p:embeddedFont>
       <p:font typeface="等线" pitchFamily="2" charset="-122"/>
-      <p:regular r:id="rId18"/>
-      <p:bold r:id="rId19"/>
+      <p:regular r:id="rId17"/>
+      <p:bold r:id="rId18"/>
     </p:embeddedFont>
     <p:embeddedFont>
       <p:font typeface="Berlin Sans FB" pitchFamily="34" charset="0"/>
-      <p:regular r:id="rId20"/>
-      <p:bold r:id="rId21"/>
+      <p:regular r:id="rId19"/>
+      <p:bold r:id="rId20"/>
     </p:embeddedFont>
     <p:embeddedFont>
       <p:font typeface="等线 Light" pitchFamily="2" charset="-122"/>
-      <p:regular r:id="rId22"/>
+      <p:regular r:id="rId21"/>
     </p:embeddedFont>
   </p:embeddedFontLst>
   <p:defaultTextStyle>
@@ -774,7 +773,7 @@
             <a:fld id="{02060846-4A6F-480F-A4C6-C87C6D09F16E}" type="slidenum">
               <a:rPr lang="zh-CN" altLang="en-US" smtClean="0"/>
               <a:pPr/>
-              <a:t>6</a:t>
+              <a:t>5</a:t>
             </a:fld>
             <a:endParaRPr lang="zh-CN" altLang="en-US"/>
           </a:p>
@@ -869,7 +868,7 @@
             <a:fld id="{02060846-4A6F-480F-A4C6-C87C6D09F16E}" type="slidenum">
               <a:rPr lang="zh-CN" altLang="en-US" smtClean="0"/>
               <a:pPr/>
-              <a:t>8</a:t>
+              <a:t>7</a:t>
             </a:fld>
             <a:endParaRPr lang="zh-CN" altLang="en-US"/>
           </a:p>
@@ -958,7 +957,7 @@
             <a:fld id="{02060846-4A6F-480F-A4C6-C87C6D09F16E}" type="slidenum">
               <a:rPr lang="zh-CN" altLang="en-US" smtClean="0"/>
               <a:pPr/>
-              <a:t>10</a:t>
+              <a:t>9</a:t>
             </a:fld>
             <a:endParaRPr lang="zh-CN" altLang="en-US"/>
           </a:p>
@@ -4178,148 +4177,6 @@
   <p:transition spd="slow">
     <p:wipe/>
   </p:transition>
-</p:sld>
-</file>
-
-<file path=ppt/slides/slide10.xml><?xml version="1.0" encoding="utf-8"?>
-<p:sld xmlns:a="http://schemas.openxmlformats.org/drawingml/2006/main" xmlns:r="http://schemas.openxmlformats.org/officeDocument/2006/relationships" xmlns:p="http://schemas.openxmlformats.org/presentationml/2006/main">
-  <p:cSld>
-    <p:spTree>
-      <p:nvGrpSpPr>
-        <p:cNvPr id="1" name=""/>
-        <p:cNvGrpSpPr/>
-        <p:nvPr/>
-      </p:nvGrpSpPr>
-      <p:grpSpPr>
-        <a:xfrm>
-          <a:off x="0" y="0"/>
-          <a:ext cx="0" cy="0"/>
-          <a:chOff x="0" y="0"/>
-          <a:chExt cx="0" cy="0"/>
-        </a:xfrm>
-      </p:grpSpPr>
-      <p:sp>
-        <p:nvSpPr>
-          <p:cNvPr id="6" name="文本框 5">
-            <a:extLst>
-              <a:ext uri="{FF2B5EF4-FFF2-40B4-BE49-F238E27FC236}">
-                <a16:creationId xmlns="" xmlns:a16="http://schemas.microsoft.com/office/drawing/2014/main" id="{6297C91C-D92E-4F19-9818-E11CEE55D79F}"/>
-              </a:ext>
-            </a:extLst>
-          </p:cNvPr>
-          <p:cNvSpPr txBox="1"/>
-          <p:nvPr/>
-        </p:nvSpPr>
-        <p:spPr>
-          <a:xfrm>
-            <a:off x="357049" y="1243152"/>
-            <a:ext cx="5888000" cy="646331"/>
-          </a:xfrm>
-          <a:prstGeom prst="rect">
-            <a:avLst/>
-          </a:prstGeom>
-          <a:noFill/>
-        </p:spPr>
-        <p:txBody>
-          <a:bodyPr wrap="square" rtlCol="0">
-            <a:spAutoFit/>
-          </a:bodyPr>
-          <a:lstStyle/>
-          <a:p>
-            <a:r>
-              <a:rPr lang="en-US" altLang="zh-CN" sz="3600" b="1" u="sng" dirty="0" smtClean="0">
-                <a:solidFill>
-                  <a:srgbClr val="360882"/>
-                </a:solidFill>
-                <a:latin typeface="Bodoni MT Black" panose="02070A03080606020203" pitchFamily="18" charset="0"/>
-              </a:rPr>
-              <a:t>W</a:t>
-            </a:r>
-            <a:r>
-              <a:rPr lang="en-US" altLang="zh-CN" sz="3600" b="1" u="sng" dirty="0" smtClean="0">
-                <a:solidFill>
-                  <a:srgbClr val="BA2767"/>
-                </a:solidFill>
-                <a:latin typeface="Bodoni MT Black" panose="02070A03080606020203" pitchFamily="18" charset="0"/>
-              </a:rPr>
-              <a:t>a</a:t>
-            </a:r>
-            <a:r>
-              <a:rPr lang="en-US" altLang="zh-CN" sz="3600" b="1" u="sng" dirty="0" smtClean="0">
-                <a:solidFill>
-                  <a:srgbClr val="360882"/>
-                </a:solidFill>
-                <a:latin typeface="Bodoni MT Black" panose="02070A03080606020203" pitchFamily="18" charset="0"/>
-              </a:rPr>
-              <a:t>lkth</a:t>
-            </a:r>
-            <a:r>
-              <a:rPr lang="en-US" altLang="zh-CN" sz="3600" b="1" u="sng" dirty="0" smtClean="0">
-                <a:solidFill>
-                  <a:srgbClr val="BA2767"/>
-                </a:solidFill>
-                <a:latin typeface="Bodoni MT Black" panose="02070A03080606020203" pitchFamily="18" charset="0"/>
-              </a:rPr>
-              <a:t>r</a:t>
-            </a:r>
-            <a:r>
-              <a:rPr lang="en-US" altLang="zh-CN" sz="3600" b="1" u="sng" dirty="0" smtClean="0">
-                <a:solidFill>
-                  <a:srgbClr val="360882"/>
-                </a:solidFill>
-                <a:latin typeface="Bodoni MT Black" panose="02070A03080606020203" pitchFamily="18" charset="0"/>
-              </a:rPr>
-              <a:t>ough d</a:t>
-            </a:r>
-            <a:r>
-              <a:rPr lang="en-US" altLang="zh-CN" sz="3600" b="1" u="sng" dirty="0" smtClean="0">
-                <a:solidFill>
-                  <a:srgbClr val="BA2767"/>
-                </a:solidFill>
-                <a:latin typeface="Bodoni MT Black" panose="02070A03080606020203" pitchFamily="18" charset="0"/>
-              </a:rPr>
-              <a:t>em</a:t>
-            </a:r>
-            <a:r>
-              <a:rPr lang="en-US" altLang="zh-CN" sz="3600" b="1" u="sng" dirty="0" smtClean="0">
-                <a:solidFill>
-                  <a:srgbClr val="360882"/>
-                </a:solidFill>
-                <a:latin typeface="Bodoni MT Black" panose="02070A03080606020203" pitchFamily="18" charset="0"/>
-              </a:rPr>
-              <a:t>o</a:t>
-            </a:r>
-            <a:endParaRPr lang="zh-CN" altLang="en-US" sz="2800" b="1" u="sng" dirty="0">
-              <a:solidFill>
-                <a:srgbClr val="360882"/>
-              </a:solidFill>
-              <a:latin typeface="Bodoni MT Black" panose="02070A03080606020203" pitchFamily="18" charset="0"/>
-            </a:endParaRPr>
-          </a:p>
-        </p:txBody>
-      </p:sp>
-    </p:spTree>
-    <p:extLst>
-      <p:ext uri="{BB962C8B-B14F-4D97-AF65-F5344CB8AC3E}">
-        <p14:creationId xmlns="" xmlns:p14="http://schemas.microsoft.com/office/powerpoint/2010/main" val="887234809"/>
-      </p:ext>
-    </p:extLst>
-  </p:cSld>
-  <p:clrMapOvr>
-    <a:masterClrMapping/>
-  </p:clrMapOvr>
-  <mc:AlternateContent xmlns:mc="http://schemas.openxmlformats.org/markup-compatibility/2006">
-    <mc:Choice xmlns="" xmlns:p14="http://schemas.microsoft.com/office/powerpoint/2010/main" Requires="p14">
-      <p:transition spd="slow" p14:dur="1500">
-        <p:split orient="vert"/>
-      </p:transition>
-    </mc:Choice>
-    <mc:Fallback>
-      <p:transition spd="slow">
-        <p:split orient="vert"/>
-      </p:transition>
-    </mc:Fallback>
-  </mc:AlternateContent>
   <p:timing>
     <p:tnLst>
       <p:par>
@@ -4330,7 +4187,7 @@
 </p:sld>
 </file>
 
-<file path=ppt/slides/slide11.xml><?xml version="1.0" encoding="utf-8"?>
+<file path=ppt/slides/slide10.xml><?xml version="1.0" encoding="utf-8"?>
 <p:sld xmlns:a="http://schemas.openxmlformats.org/drawingml/2006/main" xmlns:r="http://schemas.openxmlformats.org/officeDocument/2006/relationships" xmlns:p="http://schemas.openxmlformats.org/presentationml/2006/main">
   <p:cSld>
     <p:spTree>
@@ -4395,6 +4252,13 @@
   <p:transition spd="slow">
     <p:wipe/>
   </p:transition>
+  <p:timing>
+    <p:tnLst>
+      <p:par>
+        <p:cTn id="1" dur="indefinite" restart="never" nodeType="tmRoot"/>
+      </p:par>
+    </p:tnLst>
+  </p:timing>
 </p:sld>
 </file>
 
@@ -4516,6 +4380,13 @@
   <p:transition spd="slow">
     <p:wipe/>
   </p:transition>
+  <p:timing>
+    <p:tnLst>
+      <p:par>
+        <p:cTn id="1" dur="indefinite" restart="never" nodeType="tmRoot"/>
+      </p:par>
+    </p:tnLst>
+  </p:timing>
 </p:sld>
 </file>
 
@@ -4834,281 +4705,17 @@
   <p:transition spd="slow">
     <p:wipe/>
   </p:transition>
+  <p:timing>
+    <p:tnLst>
+      <p:par>
+        <p:cTn id="1" dur="indefinite" restart="never" nodeType="tmRoot"/>
+      </p:par>
+    </p:tnLst>
+  </p:timing>
 </p:sld>
 </file>
 
 <file path=ppt/slides/slide4.xml><?xml version="1.0" encoding="utf-8"?>
-<p:sld xmlns:a="http://schemas.openxmlformats.org/drawingml/2006/main" xmlns:r="http://schemas.openxmlformats.org/officeDocument/2006/relationships" xmlns:p="http://schemas.openxmlformats.org/presentationml/2006/main">
-  <p:cSld>
-    <p:spTree>
-      <p:nvGrpSpPr>
-        <p:cNvPr id="1" name=""/>
-        <p:cNvGrpSpPr/>
-        <p:nvPr/>
-      </p:nvGrpSpPr>
-      <p:grpSpPr>
-        <a:xfrm>
-          <a:off x="0" y="0"/>
-          <a:ext cx="0" cy="0"/>
-          <a:chOff x="0" y="0"/>
-          <a:chExt cx="0" cy="0"/>
-        </a:xfrm>
-      </p:grpSpPr>
-      <p:sp>
-        <p:nvSpPr>
-          <p:cNvPr id="6" name="文本框 5">
-            <a:extLst>
-              <a:ext uri="{FF2B5EF4-FFF2-40B4-BE49-F238E27FC236}">
-                <a16:creationId xmlns="" xmlns:a16="http://schemas.microsoft.com/office/drawing/2014/main" id="{6297C91C-D92E-4F19-9818-E11CEE55D79F}"/>
-              </a:ext>
-            </a:extLst>
-          </p:cNvPr>
-          <p:cNvSpPr txBox="1"/>
-          <p:nvPr/>
-        </p:nvSpPr>
-        <p:spPr>
-          <a:xfrm>
-            <a:off x="357049" y="1243152"/>
-            <a:ext cx="2895601" cy="646331"/>
-          </a:xfrm>
-          <a:prstGeom prst="rect">
-            <a:avLst/>
-          </a:prstGeom>
-          <a:noFill/>
-        </p:spPr>
-        <p:txBody>
-          <a:bodyPr wrap="square" rtlCol="0">
-            <a:spAutoFit/>
-          </a:bodyPr>
-          <a:lstStyle/>
-          <a:p>
-            <a:r>
-              <a:rPr lang="en-US" altLang="zh-CN" sz="3600" b="1" u="sng" dirty="0">
-                <a:solidFill>
-                  <a:srgbClr val="360882"/>
-                </a:solidFill>
-                <a:latin typeface="Bodoni MT Black" panose="02070A03080606020203" pitchFamily="18" charset="0"/>
-              </a:rPr>
-              <a:t>Ch</a:t>
-            </a:r>
-            <a:r>
-              <a:rPr lang="en-US" altLang="zh-CN" sz="3600" b="1" u="sng" dirty="0">
-                <a:solidFill>
-                  <a:srgbClr val="BA2767"/>
-                </a:solidFill>
-                <a:latin typeface="Bodoni MT Black" panose="02070A03080606020203" pitchFamily="18" charset="0"/>
-              </a:rPr>
-              <a:t>ara</a:t>
-            </a:r>
-            <a:r>
-              <a:rPr lang="en-US" altLang="zh-CN" sz="3600" b="1" u="sng" dirty="0">
-                <a:solidFill>
-                  <a:srgbClr val="360882"/>
-                </a:solidFill>
-                <a:latin typeface="Bodoni MT Black" panose="02070A03080606020203" pitchFamily="18" charset="0"/>
-              </a:rPr>
-              <a:t>ct</a:t>
-            </a:r>
-            <a:r>
-              <a:rPr lang="en-US" altLang="zh-CN" sz="3600" b="1" u="sng" dirty="0">
-                <a:solidFill>
-                  <a:srgbClr val="BA2767"/>
-                </a:solidFill>
-                <a:latin typeface="Bodoni MT Black" panose="02070A03080606020203" pitchFamily="18" charset="0"/>
-              </a:rPr>
-              <a:t>er</a:t>
-            </a:r>
-            <a:endParaRPr lang="zh-CN" altLang="en-US" sz="3600" b="1" u="sng" dirty="0">
-              <a:solidFill>
-                <a:srgbClr val="BA2767"/>
-              </a:solidFill>
-              <a:latin typeface="Bodoni MT Black" panose="02070A03080606020203" pitchFamily="18" charset="0"/>
-            </a:endParaRPr>
-          </a:p>
-        </p:txBody>
-      </p:sp>
-      <p:sp>
-        <p:nvSpPr>
-          <p:cNvPr id="7" name="文本框 6">
-            <a:extLst>
-              <a:ext uri="{FF2B5EF4-FFF2-40B4-BE49-F238E27FC236}">
-                <a16:creationId xmlns="" xmlns:a16="http://schemas.microsoft.com/office/drawing/2014/main" id="{C7B4F456-04F1-4981-A81B-6CCB74DD7FF4}"/>
-              </a:ext>
-            </a:extLst>
-          </p:cNvPr>
-          <p:cNvSpPr txBox="1"/>
-          <p:nvPr/>
-        </p:nvSpPr>
-        <p:spPr>
-          <a:xfrm>
-            <a:off x="2384121" y="2059393"/>
-            <a:ext cx="3579223" cy="2739211"/>
-          </a:xfrm>
-          <a:prstGeom prst="rect">
-            <a:avLst/>
-          </a:prstGeom>
-          <a:noFill/>
-        </p:spPr>
-        <p:txBody>
-          <a:bodyPr wrap="square" rtlCol="0">
-            <a:spAutoFit/>
-          </a:bodyPr>
-          <a:lstStyle/>
-          <a:p>
-            <a:r>
-              <a:rPr lang="en-US" altLang="zh-CN" sz="2800" dirty="0">
-                <a:solidFill>
-                  <a:srgbClr val="360882"/>
-                </a:solidFill>
-                <a:latin typeface="Berlin Sans FB" panose="020E0602020502020306" pitchFamily="34" charset="0"/>
-              </a:rPr>
-              <a:t>Hero</a:t>
-            </a:r>
-          </a:p>
-          <a:p>
-            <a:pPr marL="285750" indent="-285750">
-              <a:buFont typeface="Arial" panose="020B0604020202020204" pitchFamily="34" charset="0"/>
-              <a:buChar char="•"/>
-            </a:pPr>
-            <a:r>
-              <a:rPr lang="en-US" altLang="zh-CN" sz="2400" dirty="0">
-                <a:solidFill>
-                  <a:srgbClr val="360882"/>
-                </a:solidFill>
-                <a:latin typeface="Berlin Sans FB" panose="020E0602020502020306" pitchFamily="34" charset="0"/>
-              </a:rPr>
-              <a:t>Name: Empty</a:t>
-            </a:r>
-          </a:p>
-          <a:p>
-            <a:pPr marL="285750" indent="-285750">
-              <a:buFont typeface="Arial" panose="020B0604020202020204" pitchFamily="34" charset="0"/>
-              <a:buChar char="•"/>
-            </a:pPr>
-            <a:r>
-              <a:rPr lang="en-US" altLang="zh-CN" sz="2400" dirty="0">
-                <a:solidFill>
-                  <a:srgbClr val="360882"/>
-                </a:solidFill>
-                <a:latin typeface="Berlin Sans FB" panose="020E0602020502020306" pitchFamily="34" charset="0"/>
-              </a:rPr>
-              <a:t>Goal: To seek dream</a:t>
-            </a:r>
-          </a:p>
-          <a:p>
-            <a:pPr marL="285750" indent="-285750">
-              <a:buFont typeface="Arial" panose="020B0604020202020204" pitchFamily="34" charset="0"/>
-              <a:buChar char="•"/>
-            </a:pPr>
-            <a:r>
-              <a:rPr lang="en-US" altLang="zh-CN" sz="2400" dirty="0">
-                <a:solidFill>
-                  <a:srgbClr val="360882"/>
-                </a:solidFill>
-                <a:latin typeface="Berlin Sans FB" panose="020E0602020502020306" pitchFamily="34" charset="0"/>
-              </a:rPr>
-              <a:t>Equip: Gun</a:t>
-            </a:r>
-          </a:p>
-          <a:p>
-            <a:pPr marL="285750" indent="-285750">
-              <a:buFont typeface="Arial" panose="020B0604020202020204" pitchFamily="34" charset="0"/>
-              <a:buChar char="•"/>
-            </a:pPr>
-            <a:r>
-              <a:rPr lang="en-US" altLang="zh-CN" sz="2400" dirty="0">
-                <a:solidFill>
-                  <a:srgbClr val="360882"/>
-                </a:solidFill>
-                <a:latin typeface="Berlin Sans FB" panose="020E0602020502020306" pitchFamily="34" charset="0"/>
-              </a:rPr>
-              <a:t>Skill:</a:t>
-            </a:r>
-          </a:p>
-          <a:p>
-            <a:pPr marL="742950" lvl="1" indent="-285750">
-              <a:buFont typeface="Arial" panose="020B0604020202020204" pitchFamily="34" charset="0"/>
-              <a:buChar char="•"/>
-            </a:pPr>
-            <a:r>
-              <a:rPr lang="en-US" altLang="zh-CN" sz="2400" dirty="0">
-                <a:solidFill>
-                  <a:srgbClr val="360882"/>
-                </a:solidFill>
-                <a:latin typeface="Berlin Sans FB" panose="020E0602020502020306" pitchFamily="34" charset="0"/>
-              </a:rPr>
-              <a:t>Shoot</a:t>
-            </a:r>
-          </a:p>
-          <a:p>
-            <a:pPr marL="742950" lvl="1" indent="-285750">
-              <a:buFont typeface="Arial" panose="020B0604020202020204" pitchFamily="34" charset="0"/>
-              <a:buChar char="•"/>
-            </a:pPr>
-            <a:r>
-              <a:rPr lang="en-US" altLang="zh-CN" sz="2400" dirty="0">
-                <a:solidFill>
-                  <a:srgbClr val="360882"/>
-                </a:solidFill>
-                <a:latin typeface="Berlin Sans FB" panose="020E0602020502020306" pitchFamily="34" charset="0"/>
-              </a:rPr>
-              <a:t>Jump / Double jump</a:t>
-            </a:r>
-          </a:p>
-        </p:txBody>
-      </p:sp>
-      <p:pic>
-        <p:nvPicPr>
-          <p:cNvPr id="3" name="图片 2">
-            <a:extLst>
-              <a:ext uri="{FF2B5EF4-FFF2-40B4-BE49-F238E27FC236}">
-                <a16:creationId xmlns="" xmlns:a16="http://schemas.microsoft.com/office/drawing/2014/main" id="{C7A7EC4A-F495-479D-8E06-9E922312C0D1}"/>
-              </a:ext>
-            </a:extLst>
-          </p:cNvPr>
-          <p:cNvPicPr>
-            <a:picLocks noChangeAspect="1"/>
-          </p:cNvPicPr>
-          <p:nvPr/>
-        </p:nvPicPr>
-        <p:blipFill rotWithShape="1">
-          <a:blip r:embed="rId2" cstate="print">
-            <a:extLst>
-              <a:ext uri="{28A0092B-C50C-407E-A947-70E740481C1C}">
-                <a14:useLocalDpi xmlns="" xmlns:a14="http://schemas.microsoft.com/office/drawing/2010/main" val="0"/>
-              </a:ext>
-            </a:extLst>
-          </a:blip>
-          <a:srcRect l="22847" t="12782" r="55419" b="10071"/>
-          <a:stretch/>
-        </p:blipFill>
-        <p:spPr>
-          <a:xfrm>
-            <a:off x="7791189" y="1415775"/>
-            <a:ext cx="2016690" cy="4026448"/>
-          </a:xfrm>
-          <a:prstGeom prst="rect">
-            <a:avLst/>
-          </a:prstGeom>
-        </p:spPr>
-      </p:pic>
-    </p:spTree>
-    <p:extLst>
-      <p:ext uri="{BB962C8B-B14F-4D97-AF65-F5344CB8AC3E}">
-        <p14:creationId xmlns="" xmlns:p14="http://schemas.microsoft.com/office/powerpoint/2010/main" val="1276365123"/>
-      </p:ext>
-    </p:extLst>
-  </p:cSld>
-  <p:clrMapOvr>
-    <a:masterClrMapping/>
-  </p:clrMapOvr>
-  <p:transition spd="slow">
-    <p:wipe/>
-  </p:transition>
-</p:sld>
-</file>
-
-<file path=ppt/slides/slide5.xml><?xml version="1.0" encoding="utf-8"?>
 <p:sld xmlns:a="http://schemas.openxmlformats.org/drawingml/2006/main" xmlns:r="http://schemas.openxmlformats.org/officeDocument/2006/relationships" xmlns:p="http://schemas.openxmlformats.org/presentationml/2006/main">
   <p:cSld>
     <p:spTree>
@@ -5210,10 +4817,17 @@
   <p:transition spd="slow">
     <p:wipe/>
   </p:transition>
+  <p:timing>
+    <p:tnLst>
+      <p:par>
+        <p:cTn id="1" dur="indefinite" restart="never" nodeType="tmRoot"/>
+      </p:par>
+    </p:tnLst>
+  </p:timing>
 </p:sld>
 </file>
 
-<file path=ppt/slides/slide6.xml><?xml version="1.0" encoding="utf-8"?>
+<file path=ppt/slides/slide5.xml><?xml version="1.0" encoding="utf-8"?>
 <p:sld xmlns:a="http://schemas.openxmlformats.org/drawingml/2006/main" xmlns:r="http://schemas.openxmlformats.org/officeDocument/2006/relationships" xmlns:p="http://schemas.openxmlformats.org/presentationml/2006/main">
   <p:cSld>
     <p:spTree>
@@ -5717,6 +5331,580 @@
   <p:transition spd="slow">
     <p:wipe/>
   </p:transition>
+  <p:timing>
+    <p:tnLst>
+      <p:par>
+        <p:cTn id="1" dur="indefinite" restart="never" nodeType="tmRoot"/>
+      </p:par>
+    </p:tnLst>
+  </p:timing>
+</p:sld>
+</file>
+
+<file path=ppt/slides/slide6.xml><?xml version="1.0" encoding="utf-8"?>
+<p:sld xmlns:a="http://schemas.openxmlformats.org/drawingml/2006/main" xmlns:r="http://schemas.openxmlformats.org/officeDocument/2006/relationships" xmlns:p="http://schemas.openxmlformats.org/presentationml/2006/main">
+  <p:cSld>
+    <p:spTree>
+      <p:nvGrpSpPr>
+        <p:cNvPr id="1" name=""/>
+        <p:cNvGrpSpPr/>
+        <p:nvPr/>
+      </p:nvGrpSpPr>
+      <p:grpSpPr>
+        <a:xfrm>
+          <a:off x="0" y="0"/>
+          <a:ext cx="0" cy="0"/>
+          <a:chOff x="0" y="0"/>
+          <a:chExt cx="0" cy="0"/>
+        </a:xfrm>
+      </p:grpSpPr>
+      <p:sp>
+        <p:nvSpPr>
+          <p:cNvPr id="6" name="文本框 5">
+            <a:extLst>
+              <a:ext uri="{FF2B5EF4-FFF2-40B4-BE49-F238E27FC236}">
+                <a16:creationId xmlns="" xmlns:a16="http://schemas.microsoft.com/office/drawing/2014/main" id="{6297C91C-D92E-4F19-9818-E11CEE55D79F}"/>
+              </a:ext>
+            </a:extLst>
+          </p:cNvPr>
+          <p:cNvSpPr txBox="1"/>
+          <p:nvPr/>
+        </p:nvSpPr>
+        <p:spPr>
+          <a:xfrm>
+            <a:off x="357049" y="1243152"/>
+            <a:ext cx="3378610" cy="646331"/>
+          </a:xfrm>
+          <a:prstGeom prst="rect">
+            <a:avLst/>
+          </a:prstGeom>
+          <a:noFill/>
+        </p:spPr>
+        <p:txBody>
+          <a:bodyPr wrap="square" rtlCol="0">
+            <a:spAutoFit/>
+          </a:bodyPr>
+          <a:lstStyle/>
+          <a:p>
+            <a:r>
+              <a:rPr lang="en-US" altLang="zh-CN" sz="3600" b="1" u="sng" dirty="0" err="1" smtClean="0">
+                <a:solidFill>
+                  <a:srgbClr val="360882"/>
+                </a:solidFill>
+                <a:latin typeface="Bodoni MT Black" panose="02070A03080606020203" pitchFamily="18" charset="0"/>
+              </a:rPr>
+              <a:t>T</a:t>
+            </a:r>
+            <a:r>
+              <a:rPr lang="en-US" altLang="zh-CN" sz="3600" b="1" u="sng" dirty="0" err="1" smtClean="0">
+                <a:solidFill>
+                  <a:srgbClr val="BA2767"/>
+                </a:solidFill>
+                <a:latin typeface="Bodoni MT Black" panose="02070A03080606020203" pitchFamily="18" charset="0"/>
+              </a:rPr>
+              <a:t>r</a:t>
+            </a:r>
+            <a:r>
+              <a:rPr lang="en-US" altLang="zh-CN" sz="3600" b="1" u="sng" dirty="0" err="1" smtClean="0">
+                <a:solidFill>
+                  <a:srgbClr val="360882"/>
+                </a:solidFill>
+                <a:latin typeface="Bodoni MT Black" panose="02070A03080606020203" pitchFamily="18" charset="0"/>
+              </a:rPr>
+              <a:t>apSyst</a:t>
+            </a:r>
+            <a:r>
+              <a:rPr lang="en-US" altLang="zh-CN" sz="3600" b="1" u="sng" dirty="0" err="1" smtClean="0">
+                <a:solidFill>
+                  <a:srgbClr val="BA2767"/>
+                </a:solidFill>
+                <a:latin typeface="Bodoni MT Black" panose="02070A03080606020203" pitchFamily="18" charset="0"/>
+              </a:rPr>
+              <a:t>em</a:t>
+            </a:r>
+            <a:endParaRPr lang="zh-CN" altLang="en-US" sz="3600" b="1" u="sng" dirty="0">
+              <a:solidFill>
+                <a:srgbClr val="BA2767"/>
+              </a:solidFill>
+              <a:latin typeface="Bodoni MT Black" panose="02070A03080606020203" pitchFamily="18" charset="0"/>
+            </a:endParaRPr>
+          </a:p>
+        </p:txBody>
+      </p:sp>
+      <p:sp>
+        <p:nvSpPr>
+          <p:cNvPr id="7" name="文本框 6">
+            <a:extLst>
+              <a:ext uri="{FF2B5EF4-FFF2-40B4-BE49-F238E27FC236}">
+                <a16:creationId xmlns="" xmlns:a16="http://schemas.microsoft.com/office/drawing/2014/main" id="{C7B4F456-04F1-4981-A81B-6CCB74DD7FF4}"/>
+              </a:ext>
+            </a:extLst>
+          </p:cNvPr>
+          <p:cNvSpPr txBox="1"/>
+          <p:nvPr/>
+        </p:nvSpPr>
+        <p:spPr>
+          <a:xfrm>
+            <a:off x="1816000" y="2672852"/>
+            <a:ext cx="4272566" cy="523220"/>
+          </a:xfrm>
+          <a:prstGeom prst="rect">
+            <a:avLst/>
+          </a:prstGeom>
+          <a:noFill/>
+        </p:spPr>
+        <p:txBody>
+          <a:bodyPr wrap="square" rtlCol="0">
+            <a:spAutoFit/>
+          </a:bodyPr>
+          <a:lstStyle/>
+          <a:p>
+            <a:r>
+              <a:rPr lang="en-US" altLang="zh-CN" sz="2800" dirty="0" smtClean="0">
+                <a:solidFill>
+                  <a:srgbClr val="BA2767"/>
+                </a:solidFill>
+                <a:latin typeface="Berlin Sans FB" panose="020E0602020502020306" pitchFamily="34" charset="0"/>
+              </a:rPr>
+              <a:t>De</a:t>
+            </a:r>
+            <a:r>
+              <a:rPr lang="en-US" altLang="zh-CN" sz="2800" dirty="0" smtClean="0">
+                <a:solidFill>
+                  <a:srgbClr val="360882"/>
+                </a:solidFill>
+                <a:latin typeface="Berlin Sans FB" panose="020E0602020502020306" pitchFamily="34" charset="0"/>
+              </a:rPr>
+              <a:t>lib</a:t>
+            </a:r>
+            <a:r>
+              <a:rPr lang="en-US" altLang="zh-CN" sz="2800" dirty="0" smtClean="0">
+                <a:solidFill>
+                  <a:srgbClr val="BA2767"/>
+                </a:solidFill>
+                <a:latin typeface="Berlin Sans FB" panose="020E0602020502020306" pitchFamily="34" charset="0"/>
+              </a:rPr>
+              <a:t>era</a:t>
+            </a:r>
+            <a:r>
+              <a:rPr lang="en-US" altLang="zh-CN" sz="2800" dirty="0" smtClean="0">
+                <a:solidFill>
+                  <a:srgbClr val="360882"/>
+                </a:solidFill>
+                <a:latin typeface="Berlin Sans FB" panose="020E0602020502020306" pitchFamily="34" charset="0"/>
+              </a:rPr>
+              <a:t>t</a:t>
+            </a:r>
+            <a:r>
+              <a:rPr lang="en-US" altLang="zh-CN" sz="2800" dirty="0" smtClean="0">
+                <a:solidFill>
+                  <a:srgbClr val="BA2767"/>
+                </a:solidFill>
+                <a:latin typeface="Berlin Sans FB" panose="020E0602020502020306" pitchFamily="34" charset="0"/>
+              </a:rPr>
+              <a:t>e</a:t>
+            </a:r>
+            <a:r>
+              <a:rPr lang="en-US" altLang="zh-CN" sz="2800" dirty="0" smtClean="0">
+                <a:solidFill>
+                  <a:srgbClr val="360882"/>
+                </a:solidFill>
+                <a:latin typeface="Berlin Sans FB" panose="020E0602020502020306" pitchFamily="34" charset="0"/>
+              </a:rPr>
+              <a:t> t</a:t>
+            </a:r>
+            <a:r>
+              <a:rPr lang="en-US" altLang="zh-CN" sz="2800" dirty="0" smtClean="0">
+                <a:solidFill>
+                  <a:srgbClr val="BA2767"/>
+                </a:solidFill>
+                <a:latin typeface="Berlin Sans FB" panose="020E0602020502020306" pitchFamily="34" charset="0"/>
+              </a:rPr>
+              <a:t>r</a:t>
+            </a:r>
+            <a:r>
+              <a:rPr lang="en-US" altLang="zh-CN" sz="2800" dirty="0" smtClean="0">
+                <a:solidFill>
+                  <a:srgbClr val="360882"/>
+                </a:solidFill>
+                <a:latin typeface="Berlin Sans FB" panose="020E0602020502020306" pitchFamily="34" charset="0"/>
+              </a:rPr>
+              <a:t>igg</a:t>
+            </a:r>
+            <a:r>
+              <a:rPr lang="en-US" altLang="zh-CN" sz="2800" dirty="0" smtClean="0">
+                <a:solidFill>
+                  <a:srgbClr val="BA2767"/>
+                </a:solidFill>
+                <a:latin typeface="Berlin Sans FB" panose="020E0602020502020306" pitchFamily="34" charset="0"/>
+              </a:rPr>
+              <a:t>e</a:t>
+            </a:r>
+            <a:r>
+              <a:rPr lang="en-US" altLang="zh-CN" sz="2800" dirty="0" smtClean="0">
+                <a:solidFill>
+                  <a:srgbClr val="360882"/>
+                </a:solidFill>
+                <a:latin typeface="Berlin Sans FB" panose="020E0602020502020306" pitchFamily="34" charset="0"/>
+              </a:rPr>
+              <a:t>r </a:t>
+            </a:r>
+            <a:r>
+              <a:rPr lang="en-US" altLang="zh-CN" sz="2800" dirty="0" smtClean="0">
+                <a:solidFill>
+                  <a:srgbClr val="BA2767"/>
+                </a:solidFill>
+                <a:latin typeface="Berlin Sans FB" panose="020E0602020502020306" pitchFamily="34" charset="0"/>
+              </a:rPr>
+              <a:t>a</a:t>
+            </a:r>
+            <a:r>
+              <a:rPr lang="en-US" altLang="zh-CN" sz="2800" dirty="0" smtClean="0">
+                <a:solidFill>
+                  <a:srgbClr val="360882"/>
+                </a:solidFill>
+                <a:latin typeface="Berlin Sans FB" panose="020E0602020502020306" pitchFamily="34" charset="0"/>
+              </a:rPr>
+              <a:t>r</a:t>
+            </a:r>
+            <a:r>
+              <a:rPr lang="en-US" altLang="zh-CN" sz="2800" dirty="0" smtClean="0">
+                <a:solidFill>
+                  <a:srgbClr val="BA2767"/>
+                </a:solidFill>
+                <a:latin typeface="Berlin Sans FB" panose="020E0602020502020306" pitchFamily="34" charset="0"/>
+              </a:rPr>
+              <a:t>ea</a:t>
+            </a:r>
+            <a:r>
+              <a:rPr lang="en-US" altLang="zh-CN" sz="2800" dirty="0" smtClean="0">
+                <a:solidFill>
+                  <a:srgbClr val="360882"/>
+                </a:solidFill>
+                <a:latin typeface="Berlin Sans FB" panose="020E0602020502020306" pitchFamily="34" charset="0"/>
+              </a:rPr>
+              <a:t> </a:t>
+            </a:r>
+            <a:endParaRPr lang="en-US" altLang="zh-CN" sz="2400" dirty="0">
+              <a:solidFill>
+                <a:srgbClr val="360882"/>
+              </a:solidFill>
+              <a:latin typeface="Berlin Sans FB" panose="020E0602020502020306" pitchFamily="34" charset="0"/>
+            </a:endParaRPr>
+          </a:p>
+        </p:txBody>
+      </p:sp>
+      <p:sp>
+        <p:nvSpPr>
+          <p:cNvPr id="9" name="文本框 8">
+            <a:extLst>
+              <a:ext uri="{FF2B5EF4-FFF2-40B4-BE49-F238E27FC236}">
+                <a16:creationId xmlns="" xmlns:a16="http://schemas.microsoft.com/office/drawing/2014/main" id="{800BFE70-AE11-4587-92EF-5E0AF975C49B}"/>
+              </a:ext>
+            </a:extLst>
+          </p:cNvPr>
+          <p:cNvSpPr txBox="1"/>
+          <p:nvPr/>
+        </p:nvSpPr>
+        <p:spPr>
+          <a:xfrm>
+            <a:off x="1804849" y="1961789"/>
+            <a:ext cx="3971483" cy="523220"/>
+          </a:xfrm>
+          <a:prstGeom prst="rect">
+            <a:avLst/>
+          </a:prstGeom>
+          <a:noFill/>
+        </p:spPr>
+        <p:txBody>
+          <a:bodyPr wrap="square" rtlCol="0">
+            <a:spAutoFit/>
+          </a:bodyPr>
+          <a:lstStyle/>
+          <a:p>
+            <a:r>
+              <a:rPr lang="en-US" altLang="zh-CN" sz="2800" dirty="0" smtClean="0">
+                <a:solidFill>
+                  <a:srgbClr val="360882"/>
+                </a:solidFill>
+                <a:latin typeface="Berlin Sans FB" panose="020E0602020502020306" pitchFamily="34" charset="0"/>
+              </a:rPr>
+              <a:t>Compl</a:t>
+            </a:r>
+            <a:r>
+              <a:rPr lang="en-US" altLang="zh-CN" sz="2800" dirty="0" smtClean="0">
+                <a:solidFill>
+                  <a:srgbClr val="BA2767"/>
+                </a:solidFill>
+                <a:latin typeface="Berlin Sans FB" panose="020E0602020502020306" pitchFamily="34" charset="0"/>
+              </a:rPr>
+              <a:t>e</a:t>
+            </a:r>
+            <a:r>
+              <a:rPr lang="en-US" altLang="zh-CN" sz="2800" dirty="0" smtClean="0">
+                <a:solidFill>
+                  <a:srgbClr val="360882"/>
+                </a:solidFill>
+                <a:latin typeface="Berlin Sans FB" panose="020E0602020502020306" pitchFamily="34" charset="0"/>
+              </a:rPr>
+              <a:t>x int</a:t>
+            </a:r>
+            <a:r>
+              <a:rPr lang="en-US" altLang="zh-CN" sz="2800" dirty="0" smtClean="0">
+                <a:solidFill>
+                  <a:srgbClr val="BA2767"/>
+                </a:solidFill>
+                <a:latin typeface="Berlin Sans FB" panose="020E0602020502020306" pitchFamily="34" charset="0"/>
+              </a:rPr>
+              <a:t>era</a:t>
+            </a:r>
+            <a:r>
+              <a:rPr lang="en-US" altLang="zh-CN" sz="2800" dirty="0" smtClean="0">
+                <a:solidFill>
+                  <a:srgbClr val="360882"/>
+                </a:solidFill>
+                <a:latin typeface="Berlin Sans FB" panose="020E0602020502020306" pitchFamily="34" charset="0"/>
+              </a:rPr>
+              <a:t>ction</a:t>
+            </a:r>
+            <a:endParaRPr lang="en-US" altLang="zh-CN" sz="2400" dirty="0">
+              <a:solidFill>
+                <a:srgbClr val="360882"/>
+              </a:solidFill>
+              <a:latin typeface="Berlin Sans FB" panose="020E0602020502020306" pitchFamily="34" charset="0"/>
+            </a:endParaRPr>
+          </a:p>
+        </p:txBody>
+      </p:sp>
+      <p:sp>
+        <p:nvSpPr>
+          <p:cNvPr id="10" name="文本框 9">
+            <a:extLst>
+              <a:ext uri="{FF2B5EF4-FFF2-40B4-BE49-F238E27FC236}">
+                <a16:creationId xmlns="" xmlns:a16="http://schemas.microsoft.com/office/drawing/2014/main" id="{107FBBD6-F399-4E5B-B0EF-EDDB2781A76B}"/>
+              </a:ext>
+            </a:extLst>
+          </p:cNvPr>
+          <p:cNvSpPr txBox="1"/>
+          <p:nvPr/>
+        </p:nvSpPr>
+        <p:spPr>
+          <a:xfrm>
+            <a:off x="1815561" y="3445428"/>
+            <a:ext cx="5867630" cy="523220"/>
+          </a:xfrm>
+          <a:prstGeom prst="rect">
+            <a:avLst/>
+          </a:prstGeom>
+          <a:noFill/>
+        </p:spPr>
+        <p:txBody>
+          <a:bodyPr wrap="square" rtlCol="0">
+            <a:spAutoFit/>
+          </a:bodyPr>
+          <a:lstStyle/>
+          <a:p>
+            <a:r>
+              <a:rPr lang="en-US" altLang="zh-CN" sz="2800" dirty="0" smtClean="0">
+                <a:solidFill>
+                  <a:srgbClr val="360882"/>
+                </a:solidFill>
+                <a:latin typeface="Berlin Sans FB" panose="020E0602020502020306" pitchFamily="34" charset="0"/>
+              </a:rPr>
+              <a:t>Suppo</a:t>
+            </a:r>
+            <a:r>
+              <a:rPr lang="en-US" altLang="zh-CN" sz="2800" dirty="0" smtClean="0">
+                <a:solidFill>
+                  <a:srgbClr val="BA2767"/>
+                </a:solidFill>
+                <a:latin typeface="Berlin Sans FB" panose="020E0602020502020306" pitchFamily="34" charset="0"/>
+              </a:rPr>
+              <a:t>r</a:t>
+            </a:r>
+            <a:r>
+              <a:rPr lang="en-US" altLang="zh-CN" sz="2800" dirty="0" smtClean="0">
+                <a:solidFill>
+                  <a:srgbClr val="360882"/>
+                </a:solidFill>
+                <a:latin typeface="Berlin Sans FB" panose="020E0602020502020306" pitchFamily="34" charset="0"/>
+              </a:rPr>
+              <a:t>t</a:t>
+            </a:r>
+            <a:r>
+              <a:rPr lang="en-US" altLang="zh-CN" sz="2800" dirty="0" smtClean="0">
+                <a:solidFill>
+                  <a:srgbClr val="BA2767"/>
+                </a:solidFill>
+                <a:latin typeface="Berlin Sans FB" panose="020E0602020502020306" pitchFamily="34" charset="0"/>
+              </a:rPr>
+              <a:t>ed</a:t>
+            </a:r>
+            <a:r>
+              <a:rPr lang="en-US" altLang="zh-CN" sz="2800" dirty="0" smtClean="0">
+                <a:solidFill>
+                  <a:srgbClr val="360882"/>
+                </a:solidFill>
+                <a:latin typeface="Berlin Sans FB" panose="020E0602020502020306" pitchFamily="34" charset="0"/>
+              </a:rPr>
+              <a:t> by th</a:t>
+            </a:r>
+            <a:r>
+              <a:rPr lang="en-US" altLang="zh-CN" sz="2800" dirty="0" smtClean="0">
+                <a:solidFill>
+                  <a:srgbClr val="BA2767"/>
+                </a:solidFill>
+                <a:latin typeface="Berlin Sans FB" panose="020E0602020502020306" pitchFamily="34" charset="0"/>
+              </a:rPr>
+              <a:t>e</a:t>
+            </a:r>
+            <a:r>
+              <a:rPr lang="en-US" altLang="zh-CN" sz="2800" dirty="0" smtClean="0">
+                <a:solidFill>
+                  <a:srgbClr val="360882"/>
+                </a:solidFill>
+                <a:latin typeface="Berlin Sans FB" panose="020E0602020502020306" pitchFamily="34" charset="0"/>
+              </a:rPr>
+              <a:t> n</a:t>
+            </a:r>
+            <a:r>
+              <a:rPr lang="en-US" altLang="zh-CN" sz="2800" dirty="0" smtClean="0">
+                <a:solidFill>
+                  <a:srgbClr val="BA2767"/>
+                </a:solidFill>
+                <a:latin typeface="Berlin Sans FB" panose="020E0602020502020306" pitchFamily="34" charset="0"/>
+              </a:rPr>
+              <a:t>e</a:t>
+            </a:r>
+            <a:r>
+              <a:rPr lang="en-US" altLang="zh-CN" sz="2800" dirty="0" smtClean="0">
+                <a:solidFill>
+                  <a:srgbClr val="360882"/>
+                </a:solidFill>
+                <a:latin typeface="Berlin Sans FB" panose="020E0602020502020306" pitchFamily="34" charset="0"/>
+              </a:rPr>
+              <a:t>w </a:t>
+            </a:r>
+            <a:r>
+              <a:rPr lang="en-US" altLang="zh-CN" sz="2800" dirty="0" smtClean="0">
+                <a:solidFill>
+                  <a:srgbClr val="BA2767"/>
+                </a:solidFill>
+                <a:latin typeface="Berlin Sans FB" panose="020E0602020502020306" pitchFamily="34" charset="0"/>
+              </a:rPr>
+              <a:t>r</a:t>
+            </a:r>
+            <a:r>
+              <a:rPr lang="en-US" altLang="zh-CN" sz="2800" dirty="0" smtClean="0">
+                <a:solidFill>
+                  <a:srgbClr val="360882"/>
+                </a:solidFill>
+                <a:latin typeface="Berlin Sans FB" panose="020E0602020502020306" pitchFamily="34" charset="0"/>
+              </a:rPr>
+              <a:t>igid syst</a:t>
+            </a:r>
+            <a:r>
+              <a:rPr lang="en-US" altLang="zh-CN" sz="2800" dirty="0" smtClean="0">
+                <a:solidFill>
+                  <a:srgbClr val="BA2767"/>
+                </a:solidFill>
+                <a:latin typeface="Berlin Sans FB" panose="020E0602020502020306" pitchFamily="34" charset="0"/>
+              </a:rPr>
+              <a:t>em</a:t>
+            </a:r>
+            <a:endParaRPr lang="en-US" altLang="zh-CN" sz="2400" dirty="0">
+              <a:solidFill>
+                <a:srgbClr val="BA2767"/>
+              </a:solidFill>
+              <a:latin typeface="Berlin Sans FB" panose="020E0602020502020306" pitchFamily="34" charset="0"/>
+            </a:endParaRPr>
+          </a:p>
+        </p:txBody>
+      </p:sp>
+      <p:sp>
+        <p:nvSpPr>
+          <p:cNvPr id="11" name="文本框 9">
+            <a:extLst>
+              <a:ext uri="{FF2B5EF4-FFF2-40B4-BE49-F238E27FC236}">
+                <a16:creationId xmlns="" xmlns:a16="http://schemas.microsoft.com/office/drawing/2014/main" id="{107FBBD6-F399-4E5B-B0EF-EDDB2781A76B}"/>
+              </a:ext>
+            </a:extLst>
+          </p:cNvPr>
+          <p:cNvSpPr txBox="1"/>
+          <p:nvPr/>
+        </p:nvSpPr>
+        <p:spPr>
+          <a:xfrm>
+            <a:off x="1822995" y="4188844"/>
+            <a:ext cx="5867630" cy="523220"/>
+          </a:xfrm>
+          <a:prstGeom prst="rect">
+            <a:avLst/>
+          </a:prstGeom>
+          <a:noFill/>
+        </p:spPr>
+        <p:txBody>
+          <a:bodyPr wrap="square" rtlCol="0">
+            <a:spAutoFit/>
+          </a:bodyPr>
+          <a:lstStyle/>
+          <a:p>
+            <a:r>
+              <a:rPr lang="en-US" altLang="zh-CN" sz="2800" dirty="0" smtClean="0">
+                <a:solidFill>
+                  <a:srgbClr val="360882"/>
+                </a:solidFill>
+                <a:latin typeface="Berlin Sans FB" panose="020E0602020502020306" pitchFamily="34" charset="0"/>
+              </a:rPr>
+              <a:t>Position of obj</a:t>
+            </a:r>
+            <a:r>
+              <a:rPr lang="en-US" altLang="zh-CN" sz="2800" dirty="0" smtClean="0">
+                <a:solidFill>
+                  <a:srgbClr val="BA2767"/>
+                </a:solidFill>
+                <a:latin typeface="Berlin Sans FB" panose="020E0602020502020306" pitchFamily="34" charset="0"/>
+              </a:rPr>
+              <a:t>e</a:t>
+            </a:r>
+            <a:r>
+              <a:rPr lang="en-US" altLang="zh-CN" sz="2800" dirty="0" smtClean="0">
+                <a:solidFill>
+                  <a:srgbClr val="360882"/>
+                </a:solidFill>
+                <a:latin typeface="Berlin Sans FB" panose="020E0602020502020306" pitchFamily="34" charset="0"/>
+              </a:rPr>
+              <a:t>cts</a:t>
+            </a:r>
+            <a:endParaRPr lang="en-US" altLang="zh-CN" sz="2400" dirty="0">
+              <a:solidFill>
+                <a:srgbClr val="BA2767"/>
+              </a:solidFill>
+              <a:latin typeface="Berlin Sans FB" panose="020E0602020502020306" pitchFamily="34" charset="0"/>
+            </a:endParaRPr>
+          </a:p>
+        </p:txBody>
+      </p:sp>
+    </p:spTree>
+    <p:extLst>
+      <p:ext uri="{BB962C8B-B14F-4D97-AF65-F5344CB8AC3E}">
+        <p14:creationId xmlns="" xmlns:p14="http://schemas.microsoft.com/office/powerpoint/2010/main" val="3907753988"/>
+      </p:ext>
+    </p:extLst>
+  </p:cSld>
+  <p:clrMapOvr>
+    <a:masterClrMapping/>
+  </p:clrMapOvr>
+  <p:transition spd="slow">
+    <p:wipe/>
+  </p:transition>
+  <p:timing>
+    <p:tnLst>
+      <p:par>
+        <p:cTn id="1" dur="indefinite" restart="never" nodeType="tmRoot"/>
+      </p:par>
+    </p:tnLst>
+  </p:timing>
 </p:sld>
 </file>
 
@@ -5752,566 +5940,6 @@
         <p:spPr>
           <a:xfrm>
             <a:off x="357049" y="1243152"/>
-            <a:ext cx="3378610" cy="646331"/>
-          </a:xfrm>
-          <a:prstGeom prst="rect">
-            <a:avLst/>
-          </a:prstGeom>
-          <a:noFill/>
-        </p:spPr>
-        <p:txBody>
-          <a:bodyPr wrap="square" rtlCol="0">
-            <a:spAutoFit/>
-          </a:bodyPr>
-          <a:lstStyle/>
-          <a:p>
-            <a:r>
-              <a:rPr lang="en-US" altLang="zh-CN" sz="3600" b="1" u="sng" dirty="0" err="1" smtClean="0">
-                <a:solidFill>
-                  <a:srgbClr val="360882"/>
-                </a:solidFill>
-                <a:latin typeface="Bodoni MT Black" panose="02070A03080606020203" pitchFamily="18" charset="0"/>
-              </a:rPr>
-              <a:t>T</a:t>
-            </a:r>
-            <a:r>
-              <a:rPr lang="en-US" altLang="zh-CN" sz="3600" b="1" u="sng" dirty="0" err="1" smtClean="0">
-                <a:solidFill>
-                  <a:srgbClr val="BA2767"/>
-                </a:solidFill>
-                <a:latin typeface="Bodoni MT Black" panose="02070A03080606020203" pitchFamily="18" charset="0"/>
-              </a:rPr>
-              <a:t>r</a:t>
-            </a:r>
-            <a:r>
-              <a:rPr lang="en-US" altLang="zh-CN" sz="3600" b="1" u="sng" dirty="0" err="1" smtClean="0">
-                <a:solidFill>
-                  <a:srgbClr val="360882"/>
-                </a:solidFill>
-                <a:latin typeface="Bodoni MT Black" panose="02070A03080606020203" pitchFamily="18" charset="0"/>
-              </a:rPr>
-              <a:t>apSyst</a:t>
-            </a:r>
-            <a:r>
-              <a:rPr lang="en-US" altLang="zh-CN" sz="3600" b="1" u="sng" dirty="0" err="1" smtClean="0">
-                <a:solidFill>
-                  <a:srgbClr val="BA2767"/>
-                </a:solidFill>
-                <a:latin typeface="Bodoni MT Black" panose="02070A03080606020203" pitchFamily="18" charset="0"/>
-              </a:rPr>
-              <a:t>em</a:t>
-            </a:r>
-            <a:endParaRPr lang="zh-CN" altLang="en-US" sz="3600" b="1" u="sng" dirty="0">
-              <a:solidFill>
-                <a:srgbClr val="BA2767"/>
-              </a:solidFill>
-              <a:latin typeface="Bodoni MT Black" panose="02070A03080606020203" pitchFamily="18" charset="0"/>
-            </a:endParaRPr>
-          </a:p>
-        </p:txBody>
-      </p:sp>
-      <p:sp>
-        <p:nvSpPr>
-          <p:cNvPr id="7" name="文本框 6">
-            <a:extLst>
-              <a:ext uri="{FF2B5EF4-FFF2-40B4-BE49-F238E27FC236}">
-                <a16:creationId xmlns="" xmlns:a16="http://schemas.microsoft.com/office/drawing/2014/main" id="{C7B4F456-04F1-4981-A81B-6CCB74DD7FF4}"/>
-              </a:ext>
-            </a:extLst>
-          </p:cNvPr>
-          <p:cNvSpPr txBox="1"/>
-          <p:nvPr/>
-        </p:nvSpPr>
-        <p:spPr>
-          <a:xfrm>
-            <a:off x="1816000" y="2672852"/>
-            <a:ext cx="4272566" cy="523220"/>
-          </a:xfrm>
-          <a:prstGeom prst="rect">
-            <a:avLst/>
-          </a:prstGeom>
-          <a:noFill/>
-        </p:spPr>
-        <p:txBody>
-          <a:bodyPr wrap="square" rtlCol="0">
-            <a:spAutoFit/>
-          </a:bodyPr>
-          <a:lstStyle/>
-          <a:p>
-            <a:r>
-              <a:rPr lang="en-US" altLang="zh-CN" sz="2800" dirty="0" smtClean="0">
-                <a:solidFill>
-                  <a:srgbClr val="BA2767"/>
-                </a:solidFill>
-                <a:latin typeface="Berlin Sans FB" panose="020E0602020502020306" pitchFamily="34" charset="0"/>
-              </a:rPr>
-              <a:t>De</a:t>
-            </a:r>
-            <a:r>
-              <a:rPr lang="en-US" altLang="zh-CN" sz="2800" dirty="0" smtClean="0">
-                <a:solidFill>
-                  <a:srgbClr val="360882"/>
-                </a:solidFill>
-                <a:latin typeface="Berlin Sans FB" panose="020E0602020502020306" pitchFamily="34" charset="0"/>
-              </a:rPr>
-              <a:t>lib</a:t>
-            </a:r>
-            <a:r>
-              <a:rPr lang="en-US" altLang="zh-CN" sz="2800" dirty="0" smtClean="0">
-                <a:solidFill>
-                  <a:srgbClr val="BA2767"/>
-                </a:solidFill>
-                <a:latin typeface="Berlin Sans FB" panose="020E0602020502020306" pitchFamily="34" charset="0"/>
-              </a:rPr>
-              <a:t>era</a:t>
-            </a:r>
-            <a:r>
-              <a:rPr lang="en-US" altLang="zh-CN" sz="2800" dirty="0" smtClean="0">
-                <a:solidFill>
-                  <a:srgbClr val="360882"/>
-                </a:solidFill>
-                <a:latin typeface="Berlin Sans FB" panose="020E0602020502020306" pitchFamily="34" charset="0"/>
-              </a:rPr>
-              <a:t>t</a:t>
-            </a:r>
-            <a:r>
-              <a:rPr lang="en-US" altLang="zh-CN" sz="2800" dirty="0" smtClean="0">
-                <a:solidFill>
-                  <a:srgbClr val="BA2767"/>
-                </a:solidFill>
-                <a:latin typeface="Berlin Sans FB" panose="020E0602020502020306" pitchFamily="34" charset="0"/>
-              </a:rPr>
-              <a:t>e</a:t>
-            </a:r>
-            <a:r>
-              <a:rPr lang="en-US" altLang="zh-CN" sz="2800" dirty="0" smtClean="0">
-                <a:solidFill>
-                  <a:srgbClr val="360882"/>
-                </a:solidFill>
-                <a:latin typeface="Berlin Sans FB" panose="020E0602020502020306" pitchFamily="34" charset="0"/>
-              </a:rPr>
-              <a:t> t</a:t>
-            </a:r>
-            <a:r>
-              <a:rPr lang="en-US" altLang="zh-CN" sz="2800" dirty="0" smtClean="0">
-                <a:solidFill>
-                  <a:srgbClr val="BA2767"/>
-                </a:solidFill>
-                <a:latin typeface="Berlin Sans FB" panose="020E0602020502020306" pitchFamily="34" charset="0"/>
-              </a:rPr>
-              <a:t>r</a:t>
-            </a:r>
-            <a:r>
-              <a:rPr lang="en-US" altLang="zh-CN" sz="2800" dirty="0" smtClean="0">
-                <a:solidFill>
-                  <a:srgbClr val="360882"/>
-                </a:solidFill>
-                <a:latin typeface="Berlin Sans FB" panose="020E0602020502020306" pitchFamily="34" charset="0"/>
-              </a:rPr>
-              <a:t>igg</a:t>
-            </a:r>
-            <a:r>
-              <a:rPr lang="en-US" altLang="zh-CN" sz="2800" dirty="0" smtClean="0">
-                <a:solidFill>
-                  <a:srgbClr val="BA2767"/>
-                </a:solidFill>
-                <a:latin typeface="Berlin Sans FB" panose="020E0602020502020306" pitchFamily="34" charset="0"/>
-              </a:rPr>
-              <a:t>e</a:t>
-            </a:r>
-            <a:r>
-              <a:rPr lang="en-US" altLang="zh-CN" sz="2800" dirty="0" smtClean="0">
-                <a:solidFill>
-                  <a:srgbClr val="360882"/>
-                </a:solidFill>
-                <a:latin typeface="Berlin Sans FB" panose="020E0602020502020306" pitchFamily="34" charset="0"/>
-              </a:rPr>
-              <a:t>r </a:t>
-            </a:r>
-            <a:r>
-              <a:rPr lang="en-US" altLang="zh-CN" sz="2800" dirty="0" smtClean="0">
-                <a:solidFill>
-                  <a:srgbClr val="BA2767"/>
-                </a:solidFill>
-                <a:latin typeface="Berlin Sans FB" panose="020E0602020502020306" pitchFamily="34" charset="0"/>
-              </a:rPr>
-              <a:t>a</a:t>
-            </a:r>
-            <a:r>
-              <a:rPr lang="en-US" altLang="zh-CN" sz="2800" dirty="0" smtClean="0">
-                <a:solidFill>
-                  <a:srgbClr val="360882"/>
-                </a:solidFill>
-                <a:latin typeface="Berlin Sans FB" panose="020E0602020502020306" pitchFamily="34" charset="0"/>
-              </a:rPr>
-              <a:t>r</a:t>
-            </a:r>
-            <a:r>
-              <a:rPr lang="en-US" altLang="zh-CN" sz="2800" dirty="0" smtClean="0">
-                <a:solidFill>
-                  <a:srgbClr val="BA2767"/>
-                </a:solidFill>
-                <a:latin typeface="Berlin Sans FB" panose="020E0602020502020306" pitchFamily="34" charset="0"/>
-              </a:rPr>
-              <a:t>ea</a:t>
-            </a:r>
-            <a:r>
-              <a:rPr lang="en-US" altLang="zh-CN" sz="2800" dirty="0" smtClean="0">
-                <a:solidFill>
-                  <a:srgbClr val="360882"/>
-                </a:solidFill>
-                <a:latin typeface="Berlin Sans FB" panose="020E0602020502020306" pitchFamily="34" charset="0"/>
-              </a:rPr>
-              <a:t> </a:t>
-            </a:r>
-            <a:endParaRPr lang="en-US" altLang="zh-CN" sz="2400" dirty="0">
-              <a:solidFill>
-                <a:srgbClr val="360882"/>
-              </a:solidFill>
-              <a:latin typeface="Berlin Sans FB" panose="020E0602020502020306" pitchFamily="34" charset="0"/>
-            </a:endParaRPr>
-          </a:p>
-        </p:txBody>
-      </p:sp>
-      <p:sp>
-        <p:nvSpPr>
-          <p:cNvPr id="9" name="文本框 8">
-            <a:extLst>
-              <a:ext uri="{FF2B5EF4-FFF2-40B4-BE49-F238E27FC236}">
-                <a16:creationId xmlns="" xmlns:a16="http://schemas.microsoft.com/office/drawing/2014/main" id="{800BFE70-AE11-4587-92EF-5E0AF975C49B}"/>
-              </a:ext>
-            </a:extLst>
-          </p:cNvPr>
-          <p:cNvSpPr txBox="1"/>
-          <p:nvPr/>
-        </p:nvSpPr>
-        <p:spPr>
-          <a:xfrm>
-            <a:off x="1804849" y="1961789"/>
-            <a:ext cx="3971483" cy="523220"/>
-          </a:xfrm>
-          <a:prstGeom prst="rect">
-            <a:avLst/>
-          </a:prstGeom>
-          <a:noFill/>
-        </p:spPr>
-        <p:txBody>
-          <a:bodyPr wrap="square" rtlCol="0">
-            <a:spAutoFit/>
-          </a:bodyPr>
-          <a:lstStyle/>
-          <a:p>
-            <a:r>
-              <a:rPr lang="en-US" altLang="zh-CN" sz="2800" dirty="0" smtClean="0">
-                <a:solidFill>
-                  <a:srgbClr val="360882"/>
-                </a:solidFill>
-                <a:latin typeface="Berlin Sans FB" panose="020E0602020502020306" pitchFamily="34" charset="0"/>
-              </a:rPr>
-              <a:t>Compl</a:t>
-            </a:r>
-            <a:r>
-              <a:rPr lang="en-US" altLang="zh-CN" sz="2800" dirty="0" smtClean="0">
-                <a:solidFill>
-                  <a:srgbClr val="BA2767"/>
-                </a:solidFill>
-                <a:latin typeface="Berlin Sans FB" panose="020E0602020502020306" pitchFamily="34" charset="0"/>
-              </a:rPr>
-              <a:t>e</a:t>
-            </a:r>
-            <a:r>
-              <a:rPr lang="en-US" altLang="zh-CN" sz="2800" dirty="0" smtClean="0">
-                <a:solidFill>
-                  <a:srgbClr val="360882"/>
-                </a:solidFill>
-                <a:latin typeface="Berlin Sans FB" panose="020E0602020502020306" pitchFamily="34" charset="0"/>
-              </a:rPr>
-              <a:t>x int</a:t>
-            </a:r>
-            <a:r>
-              <a:rPr lang="en-US" altLang="zh-CN" sz="2800" dirty="0" smtClean="0">
-                <a:solidFill>
-                  <a:srgbClr val="BA2767"/>
-                </a:solidFill>
-                <a:latin typeface="Berlin Sans FB" panose="020E0602020502020306" pitchFamily="34" charset="0"/>
-              </a:rPr>
-              <a:t>era</a:t>
-            </a:r>
-            <a:r>
-              <a:rPr lang="en-US" altLang="zh-CN" sz="2800" dirty="0" smtClean="0">
-                <a:solidFill>
-                  <a:srgbClr val="360882"/>
-                </a:solidFill>
-                <a:latin typeface="Berlin Sans FB" panose="020E0602020502020306" pitchFamily="34" charset="0"/>
-              </a:rPr>
-              <a:t>ction</a:t>
-            </a:r>
-            <a:endParaRPr lang="en-US" altLang="zh-CN" sz="2400" dirty="0">
-              <a:solidFill>
-                <a:srgbClr val="360882"/>
-              </a:solidFill>
-              <a:latin typeface="Berlin Sans FB" panose="020E0602020502020306" pitchFamily="34" charset="0"/>
-            </a:endParaRPr>
-          </a:p>
-        </p:txBody>
-      </p:sp>
-      <p:sp>
-        <p:nvSpPr>
-          <p:cNvPr id="10" name="文本框 9">
-            <a:extLst>
-              <a:ext uri="{FF2B5EF4-FFF2-40B4-BE49-F238E27FC236}">
-                <a16:creationId xmlns="" xmlns:a16="http://schemas.microsoft.com/office/drawing/2014/main" id="{107FBBD6-F399-4E5B-B0EF-EDDB2781A76B}"/>
-              </a:ext>
-            </a:extLst>
-          </p:cNvPr>
-          <p:cNvSpPr txBox="1"/>
-          <p:nvPr/>
-        </p:nvSpPr>
-        <p:spPr>
-          <a:xfrm>
-            <a:off x="1815561" y="3445428"/>
-            <a:ext cx="5867630" cy="523220"/>
-          </a:xfrm>
-          <a:prstGeom prst="rect">
-            <a:avLst/>
-          </a:prstGeom>
-          <a:noFill/>
-        </p:spPr>
-        <p:txBody>
-          <a:bodyPr wrap="square" rtlCol="0">
-            <a:spAutoFit/>
-          </a:bodyPr>
-          <a:lstStyle/>
-          <a:p>
-            <a:r>
-              <a:rPr lang="en-US" altLang="zh-CN" sz="2800" dirty="0" smtClean="0">
-                <a:solidFill>
-                  <a:srgbClr val="360882"/>
-                </a:solidFill>
-                <a:latin typeface="Berlin Sans FB" panose="020E0602020502020306" pitchFamily="34" charset="0"/>
-              </a:rPr>
-              <a:t>Suppo</a:t>
-            </a:r>
-            <a:r>
-              <a:rPr lang="en-US" altLang="zh-CN" sz="2800" dirty="0" smtClean="0">
-                <a:solidFill>
-                  <a:srgbClr val="BA2767"/>
-                </a:solidFill>
-                <a:latin typeface="Berlin Sans FB" panose="020E0602020502020306" pitchFamily="34" charset="0"/>
-              </a:rPr>
-              <a:t>r</a:t>
-            </a:r>
-            <a:r>
-              <a:rPr lang="en-US" altLang="zh-CN" sz="2800" dirty="0" smtClean="0">
-                <a:solidFill>
-                  <a:srgbClr val="360882"/>
-                </a:solidFill>
-                <a:latin typeface="Berlin Sans FB" panose="020E0602020502020306" pitchFamily="34" charset="0"/>
-              </a:rPr>
-              <a:t>t</a:t>
-            </a:r>
-            <a:r>
-              <a:rPr lang="en-US" altLang="zh-CN" sz="2800" dirty="0" smtClean="0">
-                <a:solidFill>
-                  <a:srgbClr val="BA2767"/>
-                </a:solidFill>
-                <a:latin typeface="Berlin Sans FB" panose="020E0602020502020306" pitchFamily="34" charset="0"/>
-              </a:rPr>
-              <a:t>ed</a:t>
-            </a:r>
-            <a:r>
-              <a:rPr lang="en-US" altLang="zh-CN" sz="2800" dirty="0" smtClean="0">
-                <a:solidFill>
-                  <a:srgbClr val="360882"/>
-                </a:solidFill>
-                <a:latin typeface="Berlin Sans FB" panose="020E0602020502020306" pitchFamily="34" charset="0"/>
-              </a:rPr>
-              <a:t> by th</a:t>
-            </a:r>
-            <a:r>
-              <a:rPr lang="en-US" altLang="zh-CN" sz="2800" dirty="0" smtClean="0">
-                <a:solidFill>
-                  <a:srgbClr val="BA2767"/>
-                </a:solidFill>
-                <a:latin typeface="Berlin Sans FB" panose="020E0602020502020306" pitchFamily="34" charset="0"/>
-              </a:rPr>
-              <a:t>e</a:t>
-            </a:r>
-            <a:r>
-              <a:rPr lang="en-US" altLang="zh-CN" sz="2800" dirty="0" smtClean="0">
-                <a:solidFill>
-                  <a:srgbClr val="360882"/>
-                </a:solidFill>
-                <a:latin typeface="Berlin Sans FB" panose="020E0602020502020306" pitchFamily="34" charset="0"/>
-              </a:rPr>
-              <a:t> n</a:t>
-            </a:r>
-            <a:r>
-              <a:rPr lang="en-US" altLang="zh-CN" sz="2800" dirty="0" smtClean="0">
-                <a:solidFill>
-                  <a:srgbClr val="BA2767"/>
-                </a:solidFill>
-                <a:latin typeface="Berlin Sans FB" panose="020E0602020502020306" pitchFamily="34" charset="0"/>
-              </a:rPr>
-              <a:t>e</a:t>
-            </a:r>
-            <a:r>
-              <a:rPr lang="en-US" altLang="zh-CN" sz="2800" dirty="0" smtClean="0">
-                <a:solidFill>
-                  <a:srgbClr val="360882"/>
-                </a:solidFill>
-                <a:latin typeface="Berlin Sans FB" panose="020E0602020502020306" pitchFamily="34" charset="0"/>
-              </a:rPr>
-              <a:t>w </a:t>
-            </a:r>
-            <a:r>
-              <a:rPr lang="en-US" altLang="zh-CN" sz="2800" dirty="0" smtClean="0">
-                <a:solidFill>
-                  <a:srgbClr val="BA2767"/>
-                </a:solidFill>
-                <a:latin typeface="Berlin Sans FB" panose="020E0602020502020306" pitchFamily="34" charset="0"/>
-              </a:rPr>
-              <a:t>r</a:t>
-            </a:r>
-            <a:r>
-              <a:rPr lang="en-US" altLang="zh-CN" sz="2800" dirty="0" smtClean="0">
-                <a:solidFill>
-                  <a:srgbClr val="360882"/>
-                </a:solidFill>
-                <a:latin typeface="Berlin Sans FB" panose="020E0602020502020306" pitchFamily="34" charset="0"/>
-              </a:rPr>
-              <a:t>igid syst</a:t>
-            </a:r>
-            <a:r>
-              <a:rPr lang="en-US" altLang="zh-CN" sz="2800" dirty="0" smtClean="0">
-                <a:solidFill>
-                  <a:srgbClr val="BA2767"/>
-                </a:solidFill>
-                <a:latin typeface="Berlin Sans FB" panose="020E0602020502020306" pitchFamily="34" charset="0"/>
-              </a:rPr>
-              <a:t>em</a:t>
-            </a:r>
-            <a:endParaRPr lang="en-US" altLang="zh-CN" sz="2400" dirty="0">
-              <a:solidFill>
-                <a:srgbClr val="BA2767"/>
-              </a:solidFill>
-              <a:latin typeface="Berlin Sans FB" panose="020E0602020502020306" pitchFamily="34" charset="0"/>
-            </a:endParaRPr>
-          </a:p>
-        </p:txBody>
-      </p:sp>
-      <p:sp>
-        <p:nvSpPr>
-          <p:cNvPr id="11" name="文本框 9">
-            <a:extLst>
-              <a:ext uri="{FF2B5EF4-FFF2-40B4-BE49-F238E27FC236}">
-                <a16:creationId xmlns="" xmlns:a16="http://schemas.microsoft.com/office/drawing/2014/main" id="{107FBBD6-F399-4E5B-B0EF-EDDB2781A76B}"/>
-              </a:ext>
-            </a:extLst>
-          </p:cNvPr>
-          <p:cNvSpPr txBox="1"/>
-          <p:nvPr/>
-        </p:nvSpPr>
-        <p:spPr>
-          <a:xfrm>
-            <a:off x="1822995" y="4188844"/>
-            <a:ext cx="5867630" cy="523220"/>
-          </a:xfrm>
-          <a:prstGeom prst="rect">
-            <a:avLst/>
-          </a:prstGeom>
-          <a:noFill/>
-        </p:spPr>
-        <p:txBody>
-          <a:bodyPr wrap="square" rtlCol="0">
-            <a:spAutoFit/>
-          </a:bodyPr>
-          <a:lstStyle/>
-          <a:p>
-            <a:r>
-              <a:rPr lang="en-US" altLang="zh-CN" sz="2800" dirty="0" smtClean="0">
-                <a:solidFill>
-                  <a:srgbClr val="360882"/>
-                </a:solidFill>
-                <a:latin typeface="Berlin Sans FB" panose="020E0602020502020306" pitchFamily="34" charset="0"/>
-              </a:rPr>
-              <a:t>Position of obj</a:t>
-            </a:r>
-            <a:r>
-              <a:rPr lang="en-US" altLang="zh-CN" sz="2800" dirty="0" smtClean="0">
-                <a:solidFill>
-                  <a:srgbClr val="BA2767"/>
-                </a:solidFill>
-                <a:latin typeface="Berlin Sans FB" panose="020E0602020502020306" pitchFamily="34" charset="0"/>
-              </a:rPr>
-              <a:t>e</a:t>
-            </a:r>
-            <a:r>
-              <a:rPr lang="en-US" altLang="zh-CN" sz="2800" dirty="0" smtClean="0">
-                <a:solidFill>
-                  <a:srgbClr val="360882"/>
-                </a:solidFill>
-                <a:latin typeface="Berlin Sans FB" panose="020E0602020502020306" pitchFamily="34" charset="0"/>
-              </a:rPr>
-              <a:t>cts</a:t>
-            </a:r>
-            <a:endParaRPr lang="en-US" altLang="zh-CN" sz="2400" dirty="0">
-              <a:solidFill>
-                <a:srgbClr val="BA2767"/>
-              </a:solidFill>
-              <a:latin typeface="Berlin Sans FB" panose="020E0602020502020306" pitchFamily="34" charset="0"/>
-            </a:endParaRPr>
-          </a:p>
-        </p:txBody>
-      </p:sp>
-    </p:spTree>
-    <p:extLst>
-      <p:ext uri="{BB962C8B-B14F-4D97-AF65-F5344CB8AC3E}">
-        <p14:creationId xmlns="" xmlns:p14="http://schemas.microsoft.com/office/powerpoint/2010/main" val="3907753988"/>
-      </p:ext>
-    </p:extLst>
-  </p:cSld>
-  <p:clrMapOvr>
-    <a:masterClrMapping/>
-  </p:clrMapOvr>
-  <p:transition spd="slow">
-    <p:wipe/>
-  </p:transition>
-</p:sld>
-</file>
-
-<file path=ppt/slides/slide8.xml><?xml version="1.0" encoding="utf-8"?>
-<p:sld xmlns:a="http://schemas.openxmlformats.org/drawingml/2006/main" xmlns:r="http://schemas.openxmlformats.org/officeDocument/2006/relationships" xmlns:p="http://schemas.openxmlformats.org/presentationml/2006/main">
-  <p:cSld>
-    <p:spTree>
-      <p:nvGrpSpPr>
-        <p:cNvPr id="1" name=""/>
-        <p:cNvGrpSpPr/>
-        <p:nvPr/>
-      </p:nvGrpSpPr>
-      <p:grpSpPr>
-        <a:xfrm>
-          <a:off x="0" y="0"/>
-          <a:ext cx="0" cy="0"/>
-          <a:chOff x="0" y="0"/>
-          <a:chExt cx="0" cy="0"/>
-        </a:xfrm>
-      </p:grpSpPr>
-      <p:sp>
-        <p:nvSpPr>
-          <p:cNvPr id="6" name="文本框 5">
-            <a:extLst>
-              <a:ext uri="{FF2B5EF4-FFF2-40B4-BE49-F238E27FC236}">
-                <a16:creationId xmlns="" xmlns:a16="http://schemas.microsoft.com/office/drawing/2014/main" id="{6297C91C-D92E-4F19-9818-E11CEE55D79F}"/>
-              </a:ext>
-            </a:extLst>
-          </p:cNvPr>
-          <p:cNvSpPr txBox="1"/>
-          <p:nvPr/>
-        </p:nvSpPr>
-        <p:spPr>
-          <a:xfrm>
-            <a:off x="357049" y="1243152"/>
             <a:ext cx="3470368" cy="646331"/>
           </a:xfrm>
           <a:prstGeom prst="rect">
@@ -6444,43 +6072,25 @@
                 </a:solidFill>
                 <a:latin typeface="Berlin Sans FB" panose="020E0602020502020306" pitchFamily="34" charset="0"/>
               </a:rPr>
-              <a:t> </a:t>
+              <a:t> switch (t</a:t>
             </a:r>
             <a:r>
               <a:rPr lang="en-US" altLang="zh-CN" sz="2400" dirty="0" smtClean="0">
                 <a:solidFill>
+                  <a:srgbClr val="BA2767"/>
+                </a:solidFill>
+                <a:latin typeface="Berlin Sans FB" panose="020E0602020502020306" pitchFamily="34" charset="0"/>
+              </a:rPr>
+              <a:t>r</a:t>
+            </a:r>
+            <a:r>
+              <a:rPr lang="en-US" altLang="zh-CN" sz="2400" dirty="0" smtClean="0">
+                <a:solidFill>
                   <a:srgbClr val="360882"/>
                 </a:solidFill>
                 <a:latin typeface="Berlin Sans FB" panose="020E0602020502020306" pitchFamily="34" charset="0"/>
               </a:rPr>
-              <a:t>switch (t</a:t>
-            </a:r>
-            <a:r>
-              <a:rPr lang="en-US" altLang="zh-CN" sz="2400" dirty="0" smtClean="0">
-                <a:solidFill>
-                  <a:srgbClr val="BA2767"/>
-                </a:solidFill>
-                <a:latin typeface="Berlin Sans FB" panose="020E0602020502020306" pitchFamily="34" charset="0"/>
-              </a:rPr>
-              <a:t>r</a:t>
-            </a:r>
-            <a:r>
-              <a:rPr lang="en-US" altLang="zh-CN" sz="2400" dirty="0" smtClean="0">
-                <a:solidFill>
-                  <a:srgbClr val="360882"/>
-                </a:solidFill>
-                <a:latin typeface="Berlin Sans FB" panose="020E0602020502020306" pitchFamily="34" charset="0"/>
-              </a:rPr>
-              <a:t>y </a:t>
-            </a:r>
-            <a:r>
-              <a:rPr lang="en-US" altLang="zh-CN" sz="2400" dirty="0" smtClean="0">
-                <a:solidFill>
-                  <a:srgbClr val="360882"/>
-                </a:solidFill>
-                <a:latin typeface="Berlin Sans FB" panose="020E0602020502020306" pitchFamily="34" charset="0"/>
-              </a:rPr>
-              <a:t>to jump to n</a:t>
+              <a:t>y to jump to n</a:t>
             </a:r>
             <a:r>
               <a:rPr lang="en-US" altLang="zh-CN" sz="2400" dirty="0" smtClean="0">
@@ -6585,16 +6195,7 @@
                 </a:solidFill>
                 <a:latin typeface="Berlin Sans FB" panose="020E0602020502020306" pitchFamily="34" charset="0"/>
               </a:rPr>
-              <a:t>ding </a:t>
-            </a:r>
-            <a:r>
-              <a:rPr lang="en-US" altLang="zh-CN" sz="2400" dirty="0" smtClean="0">
-                <a:solidFill>
-                  <a:srgbClr val="360882"/>
-                </a:solidFill>
-                <a:latin typeface="Berlin Sans FB" panose="020E0602020502020306" pitchFamily="34" charset="0"/>
-              </a:rPr>
-              <a:t>p</a:t>
+              <a:t>ding p</a:t>
             </a:r>
             <a:r>
               <a:rPr lang="en-US" altLang="zh-CN" sz="2400" dirty="0" smtClean="0">
@@ -6702,16 +6303,7 @@
                 </a:solidFill>
                 <a:latin typeface="Berlin Sans FB" panose="020E0602020502020306" pitchFamily="34" charset="0"/>
               </a:rPr>
-              <a:t>C</a:t>
-            </a:r>
-            <a:r>
-              <a:rPr lang="en-US" altLang="zh-CN" sz="2400" dirty="0" smtClean="0">
-                <a:solidFill>
-                  <a:srgbClr val="360882"/>
-                </a:solidFill>
-                <a:latin typeface="Berlin Sans FB" panose="020E0602020502020306" pitchFamily="34" charset="0"/>
-              </a:rPr>
-              <a:t>olo</a:t>
+              <a:t>Colo</a:t>
             </a:r>
             <a:r>
               <a:rPr lang="en-US" altLang="zh-CN" sz="2400" dirty="0" smtClean="0">
@@ -6785,12 +6377,6 @@
               </a:rPr>
               <a:t>t</a:t>
             </a:r>
-            <a:endParaRPr lang="en-US" altLang="zh-CN" sz="2400" dirty="0" smtClean="0">
-              <a:solidFill>
-                <a:srgbClr val="360882"/>
-              </a:solidFill>
-              <a:latin typeface="Berlin Sans FB" panose="020E0602020502020306" pitchFamily="34" charset="0"/>
-            </a:endParaRPr>
           </a:p>
           <a:p>
             <a:pPr marL="285750" indent="-285750">
@@ -6970,10 +6556,17 @@
   <p:transition spd="slow">
     <p:wipe/>
   </p:transition>
+  <p:timing>
+    <p:tnLst>
+      <p:par>
+        <p:cTn id="1" dur="indefinite" restart="never" nodeType="tmRoot"/>
+      </p:par>
+    </p:tnLst>
+  </p:timing>
 </p:sld>
 </file>
 
-<file path=ppt/slides/slide9.xml><?xml version="1.0" encoding="utf-8"?>
+<file path=ppt/slides/slide8.xml><?xml version="1.0" encoding="utf-8"?>
 <p:sld xmlns:a="http://schemas.openxmlformats.org/drawingml/2006/main" xmlns:r="http://schemas.openxmlformats.org/officeDocument/2006/relationships" xmlns:p="http://schemas.openxmlformats.org/presentationml/2006/main">
   <p:cSld>
     <p:spTree>
@@ -7120,6 +6713,352 @@
   <p:transition spd="slow">
     <p:wipe/>
   </p:transition>
+  <p:timing>
+    <p:tnLst>
+      <p:par>
+        <p:cTn id="1" dur="indefinite" restart="never" nodeType="tmRoot"/>
+      </p:par>
+    </p:tnLst>
+  </p:timing>
+</p:sld>
+</file>
+
+<file path=ppt/slides/slide9.xml><?xml version="1.0" encoding="utf-8"?>
+<p:sld xmlns:a="http://schemas.openxmlformats.org/drawingml/2006/main" xmlns:r="http://schemas.openxmlformats.org/officeDocument/2006/relationships" xmlns:p="http://schemas.openxmlformats.org/presentationml/2006/main">
+  <p:cSld>
+    <p:spTree>
+      <p:nvGrpSpPr>
+        <p:cNvPr id="1" name=""/>
+        <p:cNvGrpSpPr/>
+        <p:nvPr/>
+      </p:nvGrpSpPr>
+      <p:grpSpPr>
+        <a:xfrm>
+          <a:off x="0" y="0"/>
+          <a:ext cx="0" cy="0"/>
+          <a:chOff x="0" y="0"/>
+          <a:chExt cx="0" cy="0"/>
+        </a:xfrm>
+      </p:grpSpPr>
+      <p:sp>
+        <p:nvSpPr>
+          <p:cNvPr id="6" name="文本框 5">
+            <a:extLst>
+              <a:ext uri="{FF2B5EF4-FFF2-40B4-BE49-F238E27FC236}">
+                <a16:creationId xmlns="" xmlns:a16="http://schemas.microsoft.com/office/drawing/2014/main" id="{6297C91C-D92E-4F19-9818-E11CEE55D79F}"/>
+              </a:ext>
+            </a:extLst>
+          </p:cNvPr>
+          <p:cNvSpPr txBox="1"/>
+          <p:nvPr/>
+        </p:nvSpPr>
+        <p:spPr>
+          <a:xfrm>
+            <a:off x="357049" y="1243152"/>
+            <a:ext cx="5888000" cy="646331"/>
+          </a:xfrm>
+          <a:prstGeom prst="rect">
+            <a:avLst/>
+          </a:prstGeom>
+          <a:noFill/>
+        </p:spPr>
+        <p:txBody>
+          <a:bodyPr wrap="square" rtlCol="0">
+            <a:spAutoFit/>
+          </a:bodyPr>
+          <a:lstStyle/>
+          <a:p>
+            <a:r>
+              <a:rPr lang="en-US" altLang="zh-CN" sz="3600" b="1" u="sng" dirty="0" smtClean="0">
+                <a:solidFill>
+                  <a:srgbClr val="360882"/>
+                </a:solidFill>
+                <a:latin typeface="Bodoni MT Black" panose="02070A03080606020203" pitchFamily="18" charset="0"/>
+              </a:rPr>
+              <a:t>W</a:t>
+            </a:r>
+            <a:r>
+              <a:rPr lang="en-US" altLang="zh-CN" sz="3600" b="1" u="sng" dirty="0" smtClean="0">
+                <a:solidFill>
+                  <a:srgbClr val="BA2767"/>
+                </a:solidFill>
+                <a:latin typeface="Bodoni MT Black" panose="02070A03080606020203" pitchFamily="18" charset="0"/>
+              </a:rPr>
+              <a:t>a</a:t>
+            </a:r>
+            <a:r>
+              <a:rPr lang="en-US" altLang="zh-CN" sz="3600" b="1" u="sng" dirty="0" smtClean="0">
+                <a:solidFill>
+                  <a:srgbClr val="360882"/>
+                </a:solidFill>
+                <a:latin typeface="Bodoni MT Black" panose="02070A03080606020203" pitchFamily="18" charset="0"/>
+              </a:rPr>
+              <a:t>lkth</a:t>
+            </a:r>
+            <a:r>
+              <a:rPr lang="en-US" altLang="zh-CN" sz="3600" b="1" u="sng" dirty="0" smtClean="0">
+                <a:solidFill>
+                  <a:srgbClr val="BA2767"/>
+                </a:solidFill>
+                <a:latin typeface="Bodoni MT Black" panose="02070A03080606020203" pitchFamily="18" charset="0"/>
+              </a:rPr>
+              <a:t>r</a:t>
+            </a:r>
+            <a:r>
+              <a:rPr lang="en-US" altLang="zh-CN" sz="3600" b="1" u="sng" dirty="0" smtClean="0">
+                <a:solidFill>
+                  <a:srgbClr val="360882"/>
+                </a:solidFill>
+                <a:latin typeface="Bodoni MT Black" panose="02070A03080606020203" pitchFamily="18" charset="0"/>
+              </a:rPr>
+              <a:t>ough Hint</a:t>
+            </a:r>
+            <a:endParaRPr lang="zh-CN" altLang="en-US" sz="2800" b="1" u="sng" dirty="0">
+              <a:solidFill>
+                <a:srgbClr val="360882"/>
+              </a:solidFill>
+              <a:latin typeface="Bodoni MT Black" panose="02070A03080606020203" pitchFamily="18" charset="0"/>
+            </a:endParaRPr>
+          </a:p>
+        </p:txBody>
+      </p:sp>
+      <p:sp>
+        <p:nvSpPr>
+          <p:cNvPr id="5" name="矩形 4"/>
+          <p:cNvSpPr/>
+          <p:nvPr/>
+        </p:nvSpPr>
+        <p:spPr>
+          <a:xfrm>
+            <a:off x="4267200" y="3220886"/>
+            <a:ext cx="6013938" cy="646331"/>
+          </a:xfrm>
+          <a:prstGeom prst="rect">
+            <a:avLst/>
+          </a:prstGeom>
+        </p:spPr>
+        <p:txBody>
+          <a:bodyPr wrap="square">
+            <a:spAutoFit/>
+          </a:bodyPr>
+          <a:lstStyle/>
+          <a:p>
+            <a:r>
+              <a:rPr lang="en-US" altLang="zh-CN" sz="3600" dirty="0" smtClean="0">
+                <a:solidFill>
+                  <a:srgbClr val="360882"/>
+                </a:solidFill>
+                <a:latin typeface="Berlin Sans FB" panose="020E0602020502020306" pitchFamily="34" charset="0"/>
+              </a:rPr>
+              <a:t>Just go to th</a:t>
+            </a:r>
+            <a:r>
+              <a:rPr lang="en-US" altLang="zh-CN" sz="3600" dirty="0" smtClean="0">
+                <a:solidFill>
+                  <a:srgbClr val="BA2767"/>
+                </a:solidFill>
+                <a:latin typeface="Berlin Sans FB" panose="020E0602020502020306" pitchFamily="34" charset="0"/>
+              </a:rPr>
+              <a:t>e</a:t>
+            </a:r>
+            <a:r>
+              <a:rPr lang="en-US" altLang="zh-CN" sz="3600" dirty="0" smtClean="0">
+                <a:solidFill>
+                  <a:srgbClr val="360882"/>
+                </a:solidFill>
+                <a:latin typeface="Berlin Sans FB" panose="020E0602020502020306" pitchFamily="34" charset="0"/>
+              </a:rPr>
+              <a:t> l</a:t>
+            </a:r>
+            <a:r>
+              <a:rPr lang="en-US" altLang="zh-CN" sz="3600" dirty="0" smtClean="0">
+                <a:solidFill>
+                  <a:srgbClr val="BA2767"/>
+                </a:solidFill>
+                <a:latin typeface="Berlin Sans FB" panose="020E0602020502020306" pitchFamily="34" charset="0"/>
+              </a:rPr>
+              <a:t>e</a:t>
+            </a:r>
+            <a:r>
+              <a:rPr lang="en-US" altLang="zh-CN" sz="3600" dirty="0" smtClean="0">
+                <a:solidFill>
+                  <a:srgbClr val="360882"/>
+                </a:solidFill>
+                <a:latin typeface="Berlin Sans FB" panose="020E0602020502020306" pitchFamily="34" charset="0"/>
+              </a:rPr>
+              <a:t>ft w</a:t>
+            </a:r>
+            <a:r>
+              <a:rPr lang="en-US" altLang="zh-CN" sz="3600" dirty="0" smtClean="0">
+                <a:solidFill>
+                  <a:srgbClr val="BA2767"/>
+                </a:solidFill>
+                <a:latin typeface="Berlin Sans FB" panose="020E0602020502020306" pitchFamily="34" charset="0"/>
+              </a:rPr>
+              <a:t>a</a:t>
+            </a:r>
+            <a:r>
+              <a:rPr lang="en-US" altLang="zh-CN" sz="3600" dirty="0" smtClean="0">
+                <a:solidFill>
+                  <a:srgbClr val="360882"/>
+                </a:solidFill>
+                <a:latin typeface="Berlin Sans FB" panose="020E0602020502020306" pitchFamily="34" charset="0"/>
+              </a:rPr>
+              <a:t>y</a:t>
+            </a:r>
+            <a:endParaRPr lang="en-US" altLang="zh-CN" sz="3600" dirty="0">
+              <a:solidFill>
+                <a:srgbClr val="360882"/>
+              </a:solidFill>
+              <a:latin typeface="Berlin Sans FB" panose="020E0602020502020306" pitchFamily="34" charset="0"/>
+            </a:endParaRPr>
+          </a:p>
+        </p:txBody>
+      </p:sp>
+      <p:pic>
+        <p:nvPicPr>
+          <p:cNvPr id="3" name="图片 2">
+            <a:extLst>
+              <a:ext uri="{FF2B5EF4-FFF2-40B4-BE49-F238E27FC236}">
+                <a16:creationId xmlns="" xmlns:a16="http://schemas.microsoft.com/office/drawing/2014/main" id="{653F8C06-4710-41C2-8E01-16629E9F58B7}"/>
+              </a:ext>
+            </a:extLst>
+          </p:cNvPr>
+          <p:cNvPicPr>
+            <a:picLocks noChangeAspect="1"/>
+          </p:cNvPicPr>
+          <p:nvPr/>
+        </p:nvPicPr>
+        <p:blipFill rotWithShape="1">
+          <a:blip r:embed="rId3" cstate="print">
+            <a:extLst>
+              <a:ext uri="{BEBA8EAE-BF5A-486C-A8C5-ECC9F3942E4B}">
+                <a14:imgProps xmlns="" xmlns:a14="http://schemas.microsoft.com/office/drawing/2010/main">
+                  <a14:imgLayer r:embed="rId4">
+                    <a14:imgEffect>
+                      <a14:artisticFilmGrain/>
+                    </a14:imgEffect>
+                  </a14:imgLayer>
+                </a14:imgProps>
+              </a:ext>
+              <a:ext uri="{28A0092B-C50C-407E-A947-70E740481C1C}">
+                <a14:useLocalDpi xmlns="" xmlns:a14="http://schemas.microsoft.com/office/drawing/2010/main" val="0"/>
+              </a:ext>
+            </a:extLst>
+          </a:blip>
+          <a:srcRect l="15943" t="23349" r="13727" b="33942"/>
+          <a:stretch/>
+        </p:blipFill>
+        <p:spPr>
+          <a:xfrm rot="20707107">
+            <a:off x="2147310" y="2106596"/>
+            <a:ext cx="7646945" cy="3038766"/>
+          </a:xfrm>
+          <a:prstGeom prst="rect">
+            <a:avLst/>
+          </a:prstGeom>
+        </p:spPr>
+      </p:pic>
+    </p:spTree>
+    <p:extLst>
+      <p:ext uri="{BB962C8B-B14F-4D97-AF65-F5344CB8AC3E}">
+        <p14:creationId xmlns="" xmlns:p14="http://schemas.microsoft.com/office/powerpoint/2010/main" val="887234809"/>
+      </p:ext>
+    </p:extLst>
+  </p:cSld>
+  <p:clrMapOvr>
+    <a:masterClrMapping/>
+  </p:clrMapOvr>
+  <mc:AlternateContent xmlns:mc="http://schemas.openxmlformats.org/markup-compatibility/2006">
+    <mc:Choice xmlns="" xmlns:p14="http://schemas.microsoft.com/office/powerpoint/2010/main" Requires="p14">
+      <p:transition spd="slow" p14:dur="1500">
+        <p:split orient="vert"/>
+      </p:transition>
+    </mc:Choice>
+    <mc:Fallback>
+      <p:transition spd="slow">
+        <p:split orient="vert"/>
+      </p:transition>
+    </mc:Fallback>
+  </mc:AlternateContent>
+  <p:timing>
+    <p:tnLst>
+      <p:par>
+        <p:cTn id="1" dur="indefinite" restart="never" nodeType="tmRoot">
+          <p:childTnLst>
+            <p:seq concurrent="1" nextAc="seek">
+              <p:cTn id="2" restart="whenNotActive" fill="hold" evtFilter="cancelBubble" nodeType="interactiveSeq">
+                <p:stCondLst>
+                  <p:cond evt="onClick" delay="0">
+                    <p:tgtEl>
+                      <p:spTgt spid="3"/>
+                    </p:tgtEl>
+                  </p:cond>
+                </p:stCondLst>
+                <p:endSync evt="end" delay="0">
+                  <p:rtn val="all"/>
+                </p:endSync>
+                <p:childTnLst>
+                  <p:par>
+                    <p:cTn id="3" fill="hold">
+                      <p:stCondLst>
+                        <p:cond delay="0"/>
+                      </p:stCondLst>
+                      <p:childTnLst>
+                        <p:par>
+                          <p:cTn id="4" fill="hold">
+                            <p:stCondLst>
+                              <p:cond delay="0"/>
+                            </p:stCondLst>
+                            <p:childTnLst>
+                              <p:par>
+                                <p:cTn id="5" presetID="1" presetClass="exit" presetSubtype="0" fill="hold" nodeType="clickEffect">
+                                  <p:stCondLst>
+                                    <p:cond delay="0"/>
+                                  </p:stCondLst>
+                                  <p:childTnLst>
+                                    <p:set>
+                                      <p:cBhvr>
+                                        <p:cTn id="6" dur="1" fill="hold">
+                                          <p:stCondLst>
+                                            <p:cond delay="0"/>
+                                          </p:stCondLst>
+                                        </p:cTn>
+                                        <p:tgtEl>
+                                          <p:spTgt spid="3"/>
+                                        </p:tgtEl>
+                                        <p:attrNameLst>
+                                          <p:attrName>style.visibility</p:attrName>
+                                        </p:attrNameLst>
+                                      </p:cBhvr>
+                                      <p:to>
+                                        <p:strVal val="hidden"/>
+                                      </p:to>
+                                    </p:set>
+                                  </p:childTnLst>
+                                </p:cTn>
+                              </p:par>
+                            </p:childTnLst>
+                          </p:cTn>
+                        </p:par>
+                      </p:childTnLst>
+                    </p:cTn>
+                  </p:par>
+                </p:childTnLst>
+              </p:cTn>
+              <p:nextCondLst>
+                <p:cond evt="onClick" delay="0">
+                  <p:tgtEl>
+                    <p:spTgt spid="3"/>
+                  </p:tgtEl>
+                </p:cond>
+              </p:nextCondLst>
+            </p:seq>
+          </p:childTnLst>
+        </p:cTn>
+      </p:par>
+    </p:tnLst>
+  </p:timing>
 </p:sld>
 </file>
 

</xml_diff>